<commit_message>
updated ppt, added globalization example
</commit_message>
<xml_diff>
--- a/Mar/kendo-ui/src/day 1/Kendo UI - Day 1.pptx
+++ b/Mar/kendo-ui/src/day 1/Kendo UI - Day 1.pptx
@@ -5,7 +5,7 @@
     <p:sldMasterId id="2147483708" r:id="rId1"/>
   </p:sldMasterIdLst>
   <p:notesMasterIdLst>
-    <p:notesMasterId r:id="rId24"/>
+    <p:notesMasterId r:id="rId28"/>
   </p:notesMasterIdLst>
   <p:sldIdLst>
     <p:sldId id="259" r:id="rId2"/>
@@ -20,8 +20,8 @@
     <p:sldId id="273" r:id="rId11"/>
     <p:sldId id="274" r:id="rId12"/>
     <p:sldId id="275" r:id="rId13"/>
-    <p:sldId id="261" r:id="rId14"/>
-    <p:sldId id="276" r:id="rId15"/>
+    <p:sldId id="276" r:id="rId14"/>
+    <p:sldId id="261" r:id="rId15"/>
     <p:sldId id="262" r:id="rId16"/>
     <p:sldId id="263" r:id="rId17"/>
     <p:sldId id="264" r:id="rId18"/>
@@ -30,6 +30,10 @@
     <p:sldId id="267" r:id="rId21"/>
     <p:sldId id="277" r:id="rId22"/>
     <p:sldId id="278" r:id="rId23"/>
+    <p:sldId id="282" r:id="rId24"/>
+    <p:sldId id="281" r:id="rId25"/>
+    <p:sldId id="279" r:id="rId26"/>
+    <p:sldId id="280" r:id="rId27"/>
   </p:sldIdLst>
   <p:sldSz cx="9144000" cy="6858000" type="screen4x3"/>
   <p:notesSz cx="6858000" cy="9144000"/>
@@ -213,7 +217,7 @@
           <a:p>
             <a:fld id="{A3EEF1FE-4C3E-4A42-AC59-1D96E84B9F9E}" type="datetimeFigureOut">
               <a:rPr lang="en-GB" smtClean="0"/>
-              <a:t>16/03/2015</a:t>
+              <a:t>22/03/2015</a:t>
             </a:fld>
             <a:endParaRPr lang="en-GB"/>
           </a:p>
@@ -1041,6 +1045,18 @@
       </p:grpSpPr>
       <p:sp>
         <p:nvSpPr>
+          <p:cNvPr id="2" name="Slide Image Placeholder 1"/>
+          <p:cNvSpPr>
+            <a:spLocks noGrp="1" noRot="1" noChangeAspect="1"/>
+          </p:cNvSpPr>
+          <p:nvPr>
+            <p:ph type="sldImg"/>
+          </p:nvPr>
+        </p:nvSpPr>
+        <p:spPr/>
+      </p:sp>
+      <p:sp>
+        <p:nvSpPr>
           <p:cNvPr id="3" name="Notes Placeholder 2"/>
           <p:cNvSpPr>
             <a:spLocks noGrp="1"/>
@@ -1054,7 +1070,73 @@
           <a:bodyPr/>
           <a:lstStyle/>
           <a:p>
-            <a:endParaRPr lang="en-US"/>
+            <a:r>
+              <a:rPr lang="en-US" sz="1200" b="0" i="0" kern="1200" dirty="0" smtClean="0">
+                <a:solidFill>
+                  <a:schemeClr val="tx1"/>
+                </a:solidFill>
+                <a:effectLst/>
+                <a:latin typeface="+mn-lt"/>
+                <a:ea typeface="+mn-ea"/>
+                <a:cs typeface="+mn-cs"/>
+              </a:rPr>
+              <a:t>Validator component – offers mechanism for performing client side validation.</a:t>
+            </a:r>
+          </a:p>
+          <a:p>
+            <a:r>
+              <a:rPr lang="en-US" sz="1200" b="0" i="0" kern="1200" dirty="0" smtClean="0">
+                <a:solidFill>
+                  <a:schemeClr val="tx1"/>
+                </a:solidFill>
+                <a:effectLst/>
+                <a:latin typeface="+mn-lt"/>
+                <a:ea typeface="+mn-ea"/>
+                <a:cs typeface="+mn-cs"/>
+              </a:rPr>
+              <a:t>Built around HTML5 data</a:t>
+            </a:r>
+            <a:r>
+              <a:rPr lang="en-US" sz="1200" b="0" i="0" kern="1200" baseline="0" dirty="0" smtClean="0">
+                <a:solidFill>
+                  <a:schemeClr val="tx1"/>
+                </a:solidFill>
+                <a:effectLst/>
+                <a:latin typeface="+mn-lt"/>
+                <a:ea typeface="+mn-ea"/>
+                <a:cs typeface="+mn-cs"/>
+              </a:rPr>
+              <a:t> attributes</a:t>
+            </a:r>
+          </a:p>
+          <a:p>
+            <a:r>
+              <a:rPr lang="en-US" sz="1200" b="0" i="0" kern="1200" dirty="0" smtClean="0">
+                <a:solidFill>
+                  <a:schemeClr val="tx1"/>
+                </a:solidFill>
+                <a:effectLst/>
+                <a:latin typeface="+mn-lt"/>
+                <a:ea typeface="+mn-ea"/>
+                <a:cs typeface="+mn-cs"/>
+              </a:rPr>
+              <a:t>supports variety of built-in validation rules</a:t>
+            </a:r>
+          </a:p>
+          <a:p>
+            <a:r>
+              <a:rPr lang="en-US" sz="1200" b="0" i="0" kern="1200" dirty="0" smtClean="0">
+                <a:solidFill>
+                  <a:schemeClr val="tx1"/>
+                </a:solidFill>
+                <a:effectLst/>
+                <a:latin typeface="+mn-lt"/>
+                <a:ea typeface="+mn-ea"/>
+                <a:cs typeface="+mn-cs"/>
+              </a:rPr>
+              <a:t>also provides a convenient way for setting custom rules handling</a:t>
+            </a:r>
+            <a:endParaRPr lang="en-US" dirty="0"/>
           </a:p>
         </p:txBody>
       </p:sp>
@@ -1084,7 +1166,7 @@
     </p:spTree>
     <p:extLst>
       <p:ext uri="{BB962C8B-B14F-4D97-AF65-F5344CB8AC3E}">
-        <p14:creationId xmlns:p14="http://schemas.microsoft.com/office/powerpoint/2010/main" val="2852569651"/>
+        <p14:creationId xmlns:p14="http://schemas.microsoft.com/office/powerpoint/2010/main" val="3308979118"/>
       </p:ext>
     </p:extLst>
   </p:cSld>
@@ -1113,18 +1195,6 @@
       </p:grpSpPr>
       <p:sp>
         <p:nvSpPr>
-          <p:cNvPr id="2" name="Slide Image Placeholder 1"/>
-          <p:cNvSpPr>
-            <a:spLocks noGrp="1" noRot="1" noChangeAspect="1"/>
-          </p:cNvSpPr>
-          <p:nvPr>
-            <p:ph type="sldImg"/>
-          </p:nvPr>
-        </p:nvSpPr>
-        <p:spPr/>
-      </p:sp>
-      <p:sp>
-        <p:nvSpPr>
           <p:cNvPr id="3" name="Notes Placeholder 2"/>
           <p:cNvSpPr>
             <a:spLocks noGrp="1"/>
@@ -1138,73 +1208,7 @@
           <a:bodyPr/>
           <a:lstStyle/>
           <a:p>
-            <a:r>
-              <a:rPr lang="en-US" sz="1200" b="0" i="0" kern="1200" dirty="0" smtClean="0">
-                <a:solidFill>
-                  <a:schemeClr val="tx1"/>
-                </a:solidFill>
-                <a:effectLst/>
-                <a:latin typeface="+mn-lt"/>
-                <a:ea typeface="+mn-ea"/>
-                <a:cs typeface="+mn-cs"/>
-              </a:rPr>
-              <a:t>Validator component – offers mechanism for performing client side validation.</a:t>
-            </a:r>
-          </a:p>
-          <a:p>
-            <a:r>
-              <a:rPr lang="en-US" sz="1200" b="0" i="0" kern="1200" dirty="0" smtClean="0">
-                <a:solidFill>
-                  <a:schemeClr val="tx1"/>
-                </a:solidFill>
-                <a:effectLst/>
-                <a:latin typeface="+mn-lt"/>
-                <a:ea typeface="+mn-ea"/>
-                <a:cs typeface="+mn-cs"/>
-              </a:rPr>
-              <a:t>Built around HTML5 data</a:t>
-            </a:r>
-            <a:r>
-              <a:rPr lang="en-US" sz="1200" b="0" i="0" kern="1200" baseline="0" dirty="0" smtClean="0">
-                <a:solidFill>
-                  <a:schemeClr val="tx1"/>
-                </a:solidFill>
-                <a:effectLst/>
-                <a:latin typeface="+mn-lt"/>
-                <a:ea typeface="+mn-ea"/>
-                <a:cs typeface="+mn-cs"/>
-              </a:rPr>
-              <a:t> attributes</a:t>
-            </a:r>
-          </a:p>
-          <a:p>
-            <a:r>
-              <a:rPr lang="en-US" sz="1200" b="0" i="0" kern="1200" dirty="0" smtClean="0">
-                <a:solidFill>
-                  <a:schemeClr val="tx1"/>
-                </a:solidFill>
-                <a:effectLst/>
-                <a:latin typeface="+mn-lt"/>
-                <a:ea typeface="+mn-ea"/>
-                <a:cs typeface="+mn-cs"/>
-              </a:rPr>
-              <a:t>supports variety of built-in validation rules</a:t>
-            </a:r>
-          </a:p>
-          <a:p>
-            <a:r>
-              <a:rPr lang="en-US" sz="1200" b="0" i="0" kern="1200" dirty="0" smtClean="0">
-                <a:solidFill>
-                  <a:schemeClr val="tx1"/>
-                </a:solidFill>
-                <a:effectLst/>
-                <a:latin typeface="+mn-lt"/>
-                <a:ea typeface="+mn-ea"/>
-                <a:cs typeface="+mn-cs"/>
-              </a:rPr>
-              <a:t>also provides a convenient way for setting custom rules handling</a:t>
-            </a:r>
-            <a:endParaRPr lang="en-US" dirty="0"/>
+            <a:endParaRPr lang="en-US"/>
           </a:p>
         </p:txBody>
       </p:sp>
@@ -1234,7 +1238,7 @@
     </p:spTree>
     <p:extLst>
       <p:ext uri="{BB962C8B-B14F-4D97-AF65-F5344CB8AC3E}">
-        <p14:creationId xmlns:p14="http://schemas.microsoft.com/office/powerpoint/2010/main" val="3308979118"/>
+        <p14:creationId xmlns:p14="http://schemas.microsoft.com/office/powerpoint/2010/main" val="2852569651"/>
       </p:ext>
     </p:extLst>
   </p:cSld>
@@ -1833,10 +1837,10 @@
               <a:rPr lang="en-US" baseline="0" dirty="0" err="1" smtClean="0"/>
               <a:t>jquery</a:t>
             </a:r>
-            <a:endParaRPr lang="en-GB" smtClean="0"/>
-          </a:p>
-          <a:p>
-            <a:endParaRPr lang="en-GB"/>
+            <a:endParaRPr lang="en-GB" dirty="0" smtClean="0"/>
+          </a:p>
+          <a:p>
+            <a:endParaRPr lang="en-GB" dirty="0"/>
           </a:p>
         </p:txBody>
       </p:sp>
@@ -2057,6 +2061,228 @@
 </p:notes>
 </file>
 
+<file path=ppt/notesSlides/notesSlide23.xml><?xml version="1.0" encoding="utf-8"?>
+<p:notes xmlns:a="http://schemas.openxmlformats.org/drawingml/2006/main" xmlns:r="http://schemas.openxmlformats.org/officeDocument/2006/relationships" xmlns:p="http://schemas.openxmlformats.org/presentationml/2006/main">
+  <p:cSld>
+    <p:spTree>
+      <p:nvGrpSpPr>
+        <p:cNvPr id="1" name=""/>
+        <p:cNvGrpSpPr/>
+        <p:nvPr/>
+      </p:nvGrpSpPr>
+      <p:grpSpPr>
+        <a:xfrm>
+          <a:off x="0" y="0"/>
+          <a:ext cx="0" cy="0"/>
+          <a:chOff x="0" y="0"/>
+          <a:chExt cx="0" cy="0"/>
+        </a:xfrm>
+      </p:grpSpPr>
+      <p:sp>
+        <p:nvSpPr>
+          <p:cNvPr id="3" name="Notes Placeholder 2"/>
+          <p:cNvSpPr>
+            <a:spLocks noGrp="1"/>
+          </p:cNvSpPr>
+          <p:nvPr>
+            <p:ph type="body" idx="1"/>
+          </p:nvPr>
+        </p:nvSpPr>
+        <p:spPr/>
+        <p:txBody>
+          <a:bodyPr/>
+          <a:lstStyle/>
+          <a:p>
+            <a:r>
+              <a:rPr lang="en-US" dirty="0" smtClean="0"/>
+              <a:t>Process of designing and developing apps that support different cultures</a:t>
+            </a:r>
+            <a:endParaRPr lang="en-GB" dirty="0" smtClean="0"/>
+          </a:p>
+          <a:p>
+            <a:r>
+              <a:rPr lang="en-US" dirty="0" smtClean="0"/>
+              <a:t>Also knows as Internationalization</a:t>
+            </a:r>
+          </a:p>
+          <a:p>
+            <a:r>
+              <a:rPr lang="en-US" dirty="0" smtClean="0"/>
+              <a:t>Culture defines specific</a:t>
+            </a:r>
+            <a:r>
+              <a:rPr lang="en-US" baseline="0" dirty="0" smtClean="0"/>
+              <a:t> info for number formats, week and month names, date and time formats </a:t>
+            </a:r>
+            <a:r>
+              <a:rPr lang="en-US" baseline="0" dirty="0" err="1" smtClean="0"/>
+              <a:t>etc</a:t>
+            </a:r>
+            <a:endParaRPr lang="en-US" baseline="0" dirty="0" smtClean="0"/>
+          </a:p>
+          <a:p>
+            <a:r>
+              <a:rPr lang="en-US" dirty="0" smtClean="0"/>
+              <a:t>Globalize.js </a:t>
+            </a:r>
+            <a:r>
+              <a:rPr lang="en-US" smtClean="0"/>
+              <a:t>takes precedence</a:t>
+            </a:r>
+          </a:p>
+          <a:p>
+            <a:endParaRPr lang="en-US" dirty="0" smtClean="0"/>
+          </a:p>
+          <a:p>
+            <a:endParaRPr lang="en-GB" dirty="0"/>
+          </a:p>
+        </p:txBody>
+      </p:sp>
+      <p:sp>
+        <p:nvSpPr>
+          <p:cNvPr id="4" name="Slide Number Placeholder 3"/>
+          <p:cNvSpPr>
+            <a:spLocks noGrp="1"/>
+          </p:cNvSpPr>
+          <p:nvPr>
+            <p:ph type="sldNum" sz="quarter" idx="10"/>
+          </p:nvPr>
+        </p:nvSpPr>
+        <p:spPr/>
+        <p:txBody>
+          <a:bodyPr/>
+          <a:lstStyle/>
+          <a:p>
+            <a:fld id="{DC2CACC7-154D-45B0-B133-967779606221}" type="slidenum">
+              <a:rPr lang="en-GB" smtClean="0"/>
+              <a:t>23</a:t>
+            </a:fld>
+            <a:endParaRPr lang="en-GB"/>
+          </a:p>
+        </p:txBody>
+      </p:sp>
+    </p:spTree>
+    <p:extLst>
+      <p:ext uri="{BB962C8B-B14F-4D97-AF65-F5344CB8AC3E}">
+        <p14:creationId xmlns:p14="http://schemas.microsoft.com/office/powerpoint/2010/main" val="3503243378"/>
+      </p:ext>
+    </p:extLst>
+  </p:cSld>
+  <p:clrMapOvr>
+    <a:masterClrMapping/>
+  </p:clrMapOvr>
+</p:notes>
+</file>
+
+<file path=ppt/notesSlides/notesSlide24.xml><?xml version="1.0" encoding="utf-8"?>
+<p:notes xmlns:a="http://schemas.openxmlformats.org/drawingml/2006/main" xmlns:r="http://schemas.openxmlformats.org/officeDocument/2006/relationships" xmlns:p="http://schemas.openxmlformats.org/presentationml/2006/main">
+  <p:cSld>
+    <p:spTree>
+      <p:nvGrpSpPr>
+        <p:cNvPr id="1" name=""/>
+        <p:cNvGrpSpPr/>
+        <p:nvPr/>
+      </p:nvGrpSpPr>
+      <p:grpSpPr>
+        <a:xfrm>
+          <a:off x="0" y="0"/>
+          <a:ext cx="0" cy="0"/>
+          <a:chOff x="0" y="0"/>
+          <a:chExt cx="0" cy="0"/>
+        </a:xfrm>
+      </p:grpSpPr>
+      <p:sp>
+        <p:nvSpPr>
+          <p:cNvPr id="3" name="Notes Placeholder 2"/>
+          <p:cNvSpPr>
+            <a:spLocks noGrp="1"/>
+          </p:cNvSpPr>
+          <p:nvPr>
+            <p:ph type="body" idx="1"/>
+          </p:nvPr>
+        </p:nvSpPr>
+        <p:spPr/>
+        <p:txBody>
+          <a:bodyPr/>
+          <a:lstStyle/>
+          <a:p>
+            <a:r>
+              <a:rPr lang="en-US" dirty="0" smtClean="0"/>
+              <a:t>Multiple items</a:t>
+            </a:r>
+          </a:p>
+          <a:p>
+            <a:r>
+              <a:rPr lang="en-US" dirty="0" smtClean="0"/>
+              <a:t>Chaining</a:t>
+            </a:r>
+          </a:p>
+          <a:p>
+            <a:r>
+              <a:rPr lang="en-US" dirty="0" smtClean="0"/>
+              <a:t>Avoid duplicate</a:t>
+            </a:r>
+            <a:r>
+              <a:rPr lang="en-US" baseline="0" dirty="0" smtClean="0"/>
+              <a:t> initialization </a:t>
+            </a:r>
+          </a:p>
+          <a:p>
+            <a:r>
+              <a:rPr lang="en-US" dirty="0" smtClean="0"/>
+              <a:t>Obtain</a:t>
+            </a:r>
+            <a:r>
+              <a:rPr lang="en-US" baseline="0" dirty="0" smtClean="0"/>
+              <a:t> a reference using </a:t>
+            </a:r>
+            <a:r>
+              <a:rPr lang="en-US" baseline="0" dirty="0" err="1" smtClean="0"/>
+              <a:t>jquery</a:t>
+            </a:r>
+            <a:endParaRPr lang="en-GB" smtClean="0"/>
+          </a:p>
+          <a:p>
+            <a:endParaRPr lang="en-GB"/>
+          </a:p>
+        </p:txBody>
+      </p:sp>
+      <p:sp>
+        <p:nvSpPr>
+          <p:cNvPr id="4" name="Slide Number Placeholder 3"/>
+          <p:cNvSpPr>
+            <a:spLocks noGrp="1"/>
+          </p:cNvSpPr>
+          <p:nvPr>
+            <p:ph type="sldNum" sz="quarter" idx="10"/>
+          </p:nvPr>
+        </p:nvSpPr>
+        <p:spPr/>
+        <p:txBody>
+          <a:bodyPr/>
+          <a:lstStyle/>
+          <a:p>
+            <a:fld id="{DC2CACC7-154D-45B0-B133-967779606221}" type="slidenum">
+              <a:rPr lang="en-GB" smtClean="0"/>
+              <a:t>24</a:t>
+            </a:fld>
+            <a:endParaRPr lang="en-GB"/>
+          </a:p>
+        </p:txBody>
+      </p:sp>
+    </p:spTree>
+    <p:extLst>
+      <p:ext uri="{BB962C8B-B14F-4D97-AF65-F5344CB8AC3E}">
+        <p14:creationId xmlns:p14="http://schemas.microsoft.com/office/powerpoint/2010/main" val="3503243378"/>
+      </p:ext>
+    </p:extLst>
+  </p:cSld>
+  <p:clrMapOvr>
+    <a:masterClrMapping/>
+  </p:clrMapOvr>
+</p:notes>
+</file>
+
 <file path=ppt/notesSlides/notesSlide3.xml><?xml version="1.0" encoding="utf-8"?>
 <p:notes xmlns:a="http://schemas.openxmlformats.org/drawingml/2006/main" xmlns:r="http://schemas.openxmlformats.org/officeDocument/2006/relationships" xmlns:p="http://schemas.openxmlformats.org/presentationml/2006/main">
   <p:cSld>
@@ -2127,6 +2353,23 @@
           </a:p>
           <a:p>
             <a:r>
+              <a:rPr lang="en-US" dirty="0" smtClean="0"/>
+              <a:t>t provide many useful and robust building blocks for modern web applications</a:t>
+            </a:r>
+          </a:p>
+          <a:p>
+            <a:endParaRPr lang="en-US" sz="1200" b="0" i="0" kern="1200" dirty="0" smtClean="0">
+              <a:solidFill>
+                <a:schemeClr val="tx1"/>
+              </a:solidFill>
+              <a:effectLst/>
+              <a:latin typeface="+mn-lt"/>
+              <a:ea typeface="+mn-ea"/>
+              <a:cs typeface="+mn-cs"/>
+            </a:endParaRPr>
+          </a:p>
+          <a:p>
+            <a:r>
               <a:rPr lang="en-US" sz="1200" b="0" i="0" kern="1200" dirty="0" smtClean="0">
                 <a:solidFill>
                   <a:schemeClr val="tx1"/>
@@ -2140,6 +2383,17 @@
             </a:r>
           </a:p>
           <a:p>
+            <a:endParaRPr lang="en-US" sz="1200" b="0" i="0" kern="1200" dirty="0" smtClean="0">
+              <a:solidFill>
+                <a:schemeClr val="tx1"/>
+              </a:solidFill>
+              <a:effectLst/>
+              <a:latin typeface="+mn-lt"/>
+              <a:ea typeface="+mn-ea"/>
+              <a:cs typeface="+mn-cs"/>
+            </a:endParaRPr>
+          </a:p>
+          <a:p>
             <a:r>
               <a:rPr lang="en-US" sz="1200" b="0" i="0" kern="1200" dirty="0" smtClean="0">
                 <a:solidFill>
@@ -2150,7 +2404,19 @@
                 <a:ea typeface="+mn-ea"/>
                 <a:cs typeface="+mn-cs"/>
               </a:rPr>
-              <a:t> Kendo UI has been built from the ground-up to deliver a rich, HTML5-based application framework </a:t>
+              <a:t>Kendo </a:t>
+            </a:r>
+            <a:r>
+              <a:rPr lang="en-US" sz="1200" b="0" i="0" kern="1200" dirty="0" smtClean="0">
+                <a:solidFill>
+                  <a:schemeClr val="tx1"/>
+                </a:solidFill>
+                <a:effectLst/>
+                <a:latin typeface="+mn-lt"/>
+                <a:ea typeface="+mn-ea"/>
+                <a:cs typeface="+mn-cs"/>
+              </a:rPr>
+              <a:t>UI has been built from the ground-up to deliver a rich, HTML5-based application framework </a:t>
             </a:r>
             <a:endParaRPr lang="en-US" dirty="0"/>
           </a:p>
@@ -2236,58 +2502,21 @@
           <a:p>
             <a:r>
               <a:rPr lang="en-US" baseline="0" dirty="0" smtClean="0"/>
-              <a:t>Leverages existing technologies to make rich immersive web applications</a:t>
+              <a:t>Leverages existing technologies to make rich immersive web </a:t>
+            </a:r>
+            <a:r>
+              <a:rPr lang="en-US" baseline="0" dirty="0" smtClean="0"/>
+              <a:t>applications</a:t>
             </a:r>
           </a:p>
           <a:p>
             <a:r>
               <a:rPr lang="en-US" dirty="0" smtClean="0"/>
-              <a:t>Web – widgets for both web and touch enabled</a:t>
-            </a:r>
-            <a:r>
-              <a:rPr lang="en-US" baseline="0" dirty="0" smtClean="0"/>
-              <a:t> desktop development</a:t>
-            </a:r>
-          </a:p>
-          <a:p>
-            <a:r>
-              <a:rPr lang="en-US" baseline="0" dirty="0" smtClean="0"/>
-              <a:t>DataViz – used for development of desktop websites as well as mobile websites, normally used for representing data which include charts as well as </a:t>
-            </a:r>
-            <a:r>
-              <a:rPr lang="en-US" baseline="0" dirty="0" err="1" smtClean="0"/>
-              <a:t>guages</a:t>
-            </a:r>
+              <a:t>pure JavaScript framework with CSS defined for styling and behaviors</a:t>
+            </a:r>
+          </a:p>
+          <a:p>
             <a:endParaRPr lang="en-US" baseline="0" dirty="0" smtClean="0"/>
-          </a:p>
-          <a:p>
-            <a:r>
-              <a:rPr lang="en-US" baseline="0" dirty="0" smtClean="0"/>
-              <a:t>Mobile – features adaptive rendering technology which displays natively feel for </a:t>
-            </a:r>
-            <a:r>
-              <a:rPr lang="en-US" baseline="0" dirty="0" err="1" smtClean="0"/>
-              <a:t>ios</a:t>
-            </a:r>
-            <a:r>
-              <a:rPr lang="en-US" baseline="0" dirty="0" smtClean="0"/>
-              <a:t>, android, </a:t>
-            </a:r>
-            <a:r>
-              <a:rPr lang="en-US" baseline="0" dirty="0" err="1" smtClean="0"/>
-              <a:t>wp</a:t>
-            </a:r>
-            <a:r>
-              <a:rPr lang="en-US" baseline="0" dirty="0" smtClean="0"/>
-              <a:t>, includes controls such as scroll view, tab strip, list view, navigation buttons</a:t>
-            </a:r>
-          </a:p>
-          <a:p>
-            <a:r>
-              <a:rPr lang="en-US" baseline="0" dirty="0" smtClean="0"/>
-              <a:t>Features – performance </a:t>
-            </a:r>
-            <a:endParaRPr lang="en-GB" dirty="0"/>
           </a:p>
         </p:txBody>
       </p:sp>
@@ -2467,8 +2696,91 @@
                 <a:ea typeface="+mn-ea"/>
                 <a:cs typeface="+mn-cs"/>
               </a:rPr>
-              <a:t>Native UI widgets for building HTML5-powered apps and sites for modern mobile devices.</a:t>
-            </a:r>
+              <a:t>Native UI widgets for building HTML5-powered apps and sites for modern mobile devices</a:t>
+            </a:r>
+            <a:r>
+              <a:rPr lang="en-US" sz="1200" b="0" i="0" kern="1200" dirty="0" smtClean="0">
+                <a:solidFill>
+                  <a:schemeClr val="tx1"/>
+                </a:solidFill>
+                <a:effectLst/>
+                <a:latin typeface="+mn-lt"/>
+                <a:ea typeface="+mn-ea"/>
+                <a:cs typeface="+mn-cs"/>
+              </a:rPr>
+              <a:t>.</a:t>
+            </a:r>
+          </a:p>
+          <a:p>
+            <a:endParaRPr lang="en-US" sz="1200" b="0" i="0" kern="1200" dirty="0" smtClean="0">
+              <a:solidFill>
+                <a:schemeClr val="tx1"/>
+              </a:solidFill>
+              <a:effectLst/>
+              <a:latin typeface="+mn-lt"/>
+              <a:ea typeface="+mn-ea"/>
+              <a:cs typeface="+mn-cs"/>
+            </a:endParaRPr>
+          </a:p>
+          <a:p>
+            <a:r>
+              <a:rPr lang="en-US" dirty="0" smtClean="0"/>
+              <a:t>Web – contains</a:t>
+            </a:r>
+            <a:r>
+              <a:rPr lang="en-US" baseline="0" dirty="0" smtClean="0"/>
+              <a:t> core functionality, </a:t>
+            </a:r>
+            <a:r>
+              <a:rPr lang="en-US" dirty="0" smtClean="0"/>
+              <a:t>widgets for both web and touch enabled</a:t>
+            </a:r>
+            <a:r>
+              <a:rPr lang="en-US" baseline="0" dirty="0" smtClean="0"/>
+              <a:t> desktop development</a:t>
+            </a:r>
+          </a:p>
+          <a:p>
+            <a:r>
+              <a:rPr lang="en-US" baseline="0" dirty="0" smtClean="0"/>
+              <a:t>DataViz – used for development of desktop websites as well as mobile websites, normally used for representing data which include charts as well as </a:t>
+            </a:r>
+            <a:r>
+              <a:rPr lang="en-US" baseline="0" dirty="0" err="1" smtClean="0"/>
+              <a:t>guages</a:t>
+            </a:r>
+            <a:endParaRPr lang="en-US" baseline="0" dirty="0" smtClean="0"/>
+          </a:p>
+          <a:p>
+            <a:r>
+              <a:rPr lang="en-US" baseline="0" dirty="0" smtClean="0"/>
+              <a:t>Mobile – features adaptive rendering technology which displays natively feel for </a:t>
+            </a:r>
+            <a:r>
+              <a:rPr lang="en-US" baseline="0" dirty="0" err="1" smtClean="0"/>
+              <a:t>ios</a:t>
+            </a:r>
+            <a:r>
+              <a:rPr lang="en-US" baseline="0" dirty="0" smtClean="0"/>
+              <a:t>, android, </a:t>
+            </a:r>
+            <a:r>
+              <a:rPr lang="en-US" baseline="0" dirty="0" err="1" smtClean="0"/>
+              <a:t>wp</a:t>
+            </a:r>
+            <a:r>
+              <a:rPr lang="en-US" baseline="0" dirty="0" smtClean="0"/>
+              <a:t>, includes controls such as scroll view, tab strip, list view, navigation buttons</a:t>
+            </a:r>
+          </a:p>
+          <a:p>
+            <a:r>
+              <a:rPr lang="en-US" baseline="0" dirty="0" smtClean="0"/>
+              <a:t>Features – performance </a:t>
+            </a:r>
+            <a:endParaRPr lang="en-GB" dirty="0" smtClean="0"/>
+          </a:p>
+          <a:p>
             <a:endParaRPr lang="en-US" dirty="0"/>
           </a:p>
         </p:txBody>
@@ -2739,8 +3051,509 @@
           <a:p>
             <a:r>
               <a:rPr lang="en-US" dirty="0" smtClean="0"/>
-              <a:t>http://jqueryuivskendoui.com/demos/widgets.html</a:t>
-            </a:r>
+              <a:t>http://</a:t>
+            </a:r>
+            <a:r>
+              <a:rPr lang="en-US" dirty="0" smtClean="0"/>
+              <a:t>jqueryuivskendoui.com/demos/widgets.html</a:t>
+            </a:r>
+          </a:p>
+          <a:p>
+            <a:endParaRPr lang="en-US" dirty="0" smtClean="0"/>
+          </a:p>
+          <a:p>
+            <a:pPr marL="0" marR="0" indent="0" algn="l" defTabSz="914400" rtl="0" eaLnBrk="1" fontAlgn="auto" latinLnBrk="0" hangingPunct="1">
+              <a:lnSpc>
+                <a:spcPct val="100000"/>
+              </a:lnSpc>
+              <a:spcBef>
+                <a:spcPts val="0"/>
+              </a:spcBef>
+              <a:spcAft>
+                <a:spcPts val="0"/>
+              </a:spcAft>
+              <a:buClrTx/>
+              <a:buSzTx/>
+              <a:buFontTx/>
+              <a:buNone/>
+              <a:tabLst/>
+              <a:defRPr/>
+            </a:pPr>
+            <a:r>
+              <a:rPr lang="en-US" sz="1200" b="0" i="0" kern="1200" dirty="0" smtClean="0">
+                <a:solidFill>
+                  <a:schemeClr val="tx1"/>
+                </a:solidFill>
+                <a:effectLst/>
+                <a:latin typeface="+mn-lt"/>
+                <a:ea typeface="+mn-ea"/>
+                <a:cs typeface="+mn-cs"/>
+              </a:rPr>
+              <a:t>For constructing</a:t>
+            </a:r>
+            <a:r>
+              <a:rPr lang="en-US" sz="1200" b="0" i="0" kern="1200" baseline="0" dirty="0" smtClean="0">
+                <a:solidFill>
+                  <a:schemeClr val="tx1"/>
+                </a:solidFill>
+                <a:effectLst/>
+                <a:latin typeface="+mn-lt"/>
+                <a:ea typeface="+mn-ea"/>
+                <a:cs typeface="+mn-cs"/>
+              </a:rPr>
+              <a:t> front-end interface of your web applications</a:t>
+            </a:r>
+          </a:p>
+          <a:p>
+            <a:endParaRPr lang="en-US" dirty="0" smtClean="0"/>
+          </a:p>
+          <a:p>
+            <a:pPr marL="0" marR="0" indent="0" algn="l" defTabSz="914400" rtl="0" eaLnBrk="1" fontAlgn="auto" latinLnBrk="0" hangingPunct="1">
+              <a:lnSpc>
+                <a:spcPct val="100000"/>
+              </a:lnSpc>
+              <a:spcBef>
+                <a:spcPts val="0"/>
+              </a:spcBef>
+              <a:spcAft>
+                <a:spcPts val="0"/>
+              </a:spcAft>
+              <a:buClrTx/>
+              <a:buSzTx/>
+              <a:buFontTx/>
+              <a:buNone/>
+              <a:tabLst/>
+              <a:defRPr/>
+            </a:pPr>
+            <a:r>
+              <a:rPr lang="en-US" dirty="0" smtClean="0"/>
+              <a:t>Themes can be customized</a:t>
+            </a:r>
+            <a:r>
+              <a:rPr lang="en-US" baseline="0" dirty="0" smtClean="0"/>
+              <a:t> by using </a:t>
+            </a:r>
+            <a:r>
+              <a:rPr lang="en-US" baseline="0" dirty="0" err="1" smtClean="0"/>
+              <a:t>themebuilder</a:t>
+            </a:r>
+            <a:r>
+              <a:rPr lang="en-US" baseline="0" dirty="0" smtClean="0"/>
+              <a:t> or by manually adding </a:t>
+            </a:r>
+            <a:r>
+              <a:rPr lang="en-US" baseline="0" dirty="0" err="1" smtClean="0"/>
+              <a:t>css</a:t>
+            </a:r>
+            <a:r>
+              <a:rPr lang="en-US" baseline="0" dirty="0" smtClean="0"/>
+              <a:t>, </a:t>
+            </a:r>
+            <a:r>
+              <a:rPr lang="en-US" baseline="0" dirty="0" err="1" smtClean="0"/>
+              <a:t>jquery</a:t>
+            </a:r>
+            <a:r>
+              <a:rPr lang="en-US" baseline="0" dirty="0" smtClean="0"/>
+              <a:t> has theme roller</a:t>
+            </a:r>
+          </a:p>
+          <a:p>
+            <a:pPr marL="0" marR="0" indent="0" algn="l" defTabSz="914400" rtl="0" eaLnBrk="1" fontAlgn="auto" latinLnBrk="0" hangingPunct="1">
+              <a:lnSpc>
+                <a:spcPct val="100000"/>
+              </a:lnSpc>
+              <a:spcBef>
+                <a:spcPts val="0"/>
+              </a:spcBef>
+              <a:spcAft>
+                <a:spcPts val="0"/>
+              </a:spcAft>
+              <a:buClrTx/>
+              <a:buSzTx/>
+              <a:buFontTx/>
+              <a:buNone/>
+              <a:tabLst/>
+              <a:defRPr/>
+            </a:pPr>
+            <a:endParaRPr lang="en-US" baseline="0" dirty="0" smtClean="0"/>
+          </a:p>
+          <a:p>
+            <a:pPr marL="0" marR="0" indent="0" algn="l" defTabSz="914400" rtl="0" eaLnBrk="1" fontAlgn="auto" latinLnBrk="0" hangingPunct="1">
+              <a:lnSpc>
+                <a:spcPct val="100000"/>
+              </a:lnSpc>
+              <a:spcBef>
+                <a:spcPts val="0"/>
+              </a:spcBef>
+              <a:spcAft>
+                <a:spcPts val="0"/>
+              </a:spcAft>
+              <a:buClrTx/>
+              <a:buSzTx/>
+              <a:buFontTx/>
+              <a:buNone/>
+              <a:tabLst/>
+              <a:defRPr/>
+            </a:pPr>
+            <a:r>
+              <a:rPr lang="en-US" baseline="0" dirty="0" smtClean="0"/>
+              <a:t>Kendo </a:t>
+            </a:r>
+            <a:r>
+              <a:rPr lang="en-US" baseline="0" dirty="0" err="1" smtClean="0"/>
+              <a:t>ui</a:t>
+            </a:r>
+            <a:r>
+              <a:rPr lang="en-US" baseline="0" dirty="0" smtClean="0"/>
+              <a:t> has fewer effects, those present are only to support the visual </a:t>
+            </a:r>
+            <a:r>
+              <a:rPr lang="en-US" baseline="0" dirty="0" err="1" smtClean="0"/>
+              <a:t>tranisitions</a:t>
+            </a:r>
+            <a:r>
+              <a:rPr lang="en-US" baseline="0" dirty="0" smtClean="0"/>
+              <a:t> that occurs in its widgets</a:t>
+            </a:r>
+          </a:p>
+          <a:p>
+            <a:pPr marL="0" marR="0" indent="0" algn="l" defTabSz="914400" rtl="0" eaLnBrk="1" fontAlgn="auto" latinLnBrk="0" hangingPunct="1">
+              <a:lnSpc>
+                <a:spcPct val="100000"/>
+              </a:lnSpc>
+              <a:spcBef>
+                <a:spcPts val="0"/>
+              </a:spcBef>
+              <a:spcAft>
+                <a:spcPts val="0"/>
+              </a:spcAft>
+              <a:buClrTx/>
+              <a:buSzTx/>
+              <a:buFontTx/>
+              <a:buNone/>
+              <a:tabLst/>
+              <a:defRPr/>
+            </a:pPr>
+            <a:endParaRPr lang="en-US" baseline="0" dirty="0" smtClean="0"/>
+          </a:p>
+          <a:p>
+            <a:pPr marL="0" marR="0" indent="0" algn="l" defTabSz="914400" rtl="0" eaLnBrk="1" fontAlgn="auto" latinLnBrk="0" hangingPunct="1">
+              <a:lnSpc>
+                <a:spcPct val="100000"/>
+              </a:lnSpc>
+              <a:spcBef>
+                <a:spcPts val="0"/>
+              </a:spcBef>
+              <a:spcAft>
+                <a:spcPts val="0"/>
+              </a:spcAft>
+              <a:buClrTx/>
+              <a:buSzTx/>
+              <a:buFontTx/>
+              <a:buNone/>
+              <a:tabLst/>
+              <a:defRPr/>
+            </a:pPr>
+            <a:r>
+              <a:rPr lang="en-US" baseline="0" dirty="0" smtClean="0"/>
+              <a:t>Interactions – </a:t>
+            </a:r>
+            <a:r>
+              <a:rPr lang="en-US" baseline="0" dirty="0" err="1" smtClean="0"/>
+              <a:t>jquery</a:t>
+            </a:r>
+            <a:r>
+              <a:rPr lang="en-US" baseline="0" dirty="0" smtClean="0"/>
+              <a:t> -&gt; </a:t>
+            </a:r>
+            <a:r>
+              <a:rPr lang="en-US" baseline="0" dirty="0" err="1" smtClean="0"/>
+              <a:t>draggable</a:t>
+            </a:r>
+            <a:r>
+              <a:rPr lang="en-US" baseline="0" dirty="0" smtClean="0"/>
+              <a:t>, droppable, resizable. Kendo – </a:t>
+            </a:r>
+            <a:r>
+              <a:rPr lang="en-US" baseline="0" dirty="0" err="1" smtClean="0"/>
+              <a:t>Draggble</a:t>
+            </a:r>
+            <a:r>
+              <a:rPr lang="en-US" baseline="0" dirty="0" smtClean="0"/>
+              <a:t>, drop target, filtering resizing, are used as part of its widgets</a:t>
+            </a:r>
+          </a:p>
+          <a:p>
+            <a:pPr marL="0" marR="0" indent="0" algn="l" defTabSz="914400" rtl="0" eaLnBrk="1" fontAlgn="auto" latinLnBrk="0" hangingPunct="1">
+              <a:lnSpc>
+                <a:spcPct val="100000"/>
+              </a:lnSpc>
+              <a:spcBef>
+                <a:spcPts val="0"/>
+              </a:spcBef>
+              <a:spcAft>
+                <a:spcPts val="0"/>
+              </a:spcAft>
+              <a:buClrTx/>
+              <a:buSzTx/>
+              <a:buFontTx/>
+              <a:buNone/>
+              <a:tabLst/>
+              <a:defRPr/>
+            </a:pPr>
+            <a:endParaRPr lang="en-US" baseline="0" dirty="0" smtClean="0"/>
+          </a:p>
+          <a:p>
+            <a:pPr marL="0" marR="0" indent="0" algn="l" defTabSz="914400" rtl="0" eaLnBrk="1" fontAlgn="auto" latinLnBrk="0" hangingPunct="1">
+              <a:lnSpc>
+                <a:spcPct val="100000"/>
+              </a:lnSpc>
+              <a:spcBef>
+                <a:spcPts val="0"/>
+              </a:spcBef>
+              <a:spcAft>
+                <a:spcPts val="0"/>
+              </a:spcAft>
+              <a:buClrTx/>
+              <a:buSzTx/>
+              <a:buFontTx/>
+              <a:buNone/>
+              <a:tabLst/>
+              <a:defRPr/>
+            </a:pPr>
+            <a:r>
+              <a:rPr lang="en-US" baseline="0" dirty="0" smtClean="0"/>
+              <a:t>Templates – </a:t>
+            </a:r>
+            <a:r>
+              <a:rPr lang="en-US" baseline="0" dirty="0" err="1" smtClean="0"/>
+              <a:t>jquery</a:t>
+            </a:r>
+            <a:r>
+              <a:rPr lang="en-US" baseline="0" dirty="0" smtClean="0"/>
+              <a:t> does not support, kendo has high </a:t>
+            </a:r>
+            <a:r>
+              <a:rPr lang="en-US" baseline="0" dirty="0" err="1" smtClean="0"/>
+              <a:t>perf</a:t>
+            </a:r>
+            <a:r>
+              <a:rPr lang="en-US" baseline="0" dirty="0" smtClean="0"/>
+              <a:t> oriented micro </a:t>
+            </a:r>
+            <a:r>
+              <a:rPr lang="en-US" baseline="0" dirty="0" err="1" smtClean="0"/>
+              <a:t>templating</a:t>
+            </a:r>
+            <a:r>
+              <a:rPr lang="en-US" baseline="0" dirty="0" smtClean="0"/>
+              <a:t> system based on implementation</a:t>
+            </a:r>
+          </a:p>
+          <a:p>
+            <a:pPr marL="0" marR="0" indent="0" algn="l" defTabSz="914400" rtl="0" eaLnBrk="1" fontAlgn="auto" latinLnBrk="0" hangingPunct="1">
+              <a:lnSpc>
+                <a:spcPct val="100000"/>
+              </a:lnSpc>
+              <a:spcBef>
+                <a:spcPts val="0"/>
+              </a:spcBef>
+              <a:spcAft>
+                <a:spcPts val="0"/>
+              </a:spcAft>
+              <a:buClrTx/>
+              <a:buSzTx/>
+              <a:buFontTx/>
+              <a:buNone/>
+              <a:tabLst/>
+              <a:defRPr/>
+            </a:pPr>
+            <a:endParaRPr lang="en-US" baseline="0" dirty="0" smtClean="0"/>
+          </a:p>
+          <a:p>
+            <a:pPr marL="0" marR="0" indent="0" algn="l" defTabSz="914400" rtl="0" eaLnBrk="1" fontAlgn="auto" latinLnBrk="0" hangingPunct="1">
+              <a:lnSpc>
+                <a:spcPct val="100000"/>
+              </a:lnSpc>
+              <a:spcBef>
+                <a:spcPts val="0"/>
+              </a:spcBef>
+              <a:spcAft>
+                <a:spcPts val="0"/>
+              </a:spcAft>
+              <a:buClrTx/>
+              <a:buSzTx/>
+              <a:buFontTx/>
+              <a:buNone/>
+              <a:tabLst/>
+              <a:defRPr/>
+            </a:pPr>
+            <a:r>
+              <a:rPr lang="en-US" baseline="0" dirty="0" err="1" smtClean="0"/>
+              <a:t>Datasource</a:t>
+            </a:r>
+            <a:r>
+              <a:rPr lang="en-US" baseline="0" dirty="0" smtClean="0"/>
+              <a:t> component – powerful abstraction of data for using local or remote data. Fully supports </a:t>
+            </a:r>
+            <a:r>
+              <a:rPr lang="en-US" baseline="0" dirty="0" err="1" smtClean="0"/>
+              <a:t>crud,sorting</a:t>
+            </a:r>
+            <a:r>
+              <a:rPr lang="en-US" baseline="0" dirty="0" smtClean="0"/>
+              <a:t>, filtering, grouping</a:t>
+            </a:r>
+          </a:p>
+          <a:p>
+            <a:pPr marL="0" marR="0" indent="0" algn="l" defTabSz="914400" rtl="0" eaLnBrk="1" fontAlgn="auto" latinLnBrk="0" hangingPunct="1">
+              <a:lnSpc>
+                <a:spcPct val="100000"/>
+              </a:lnSpc>
+              <a:spcBef>
+                <a:spcPts val="0"/>
+              </a:spcBef>
+              <a:spcAft>
+                <a:spcPts val="0"/>
+              </a:spcAft>
+              <a:buClrTx/>
+              <a:buSzTx/>
+              <a:buFontTx/>
+              <a:buNone/>
+              <a:tabLst/>
+              <a:defRPr/>
+            </a:pPr>
+            <a:endParaRPr lang="en-US" baseline="0" dirty="0" smtClean="0"/>
+          </a:p>
+          <a:p>
+            <a:pPr marL="0" marR="0" indent="0" algn="l" defTabSz="914400" rtl="0" eaLnBrk="1" fontAlgn="auto" latinLnBrk="0" hangingPunct="1">
+              <a:lnSpc>
+                <a:spcPct val="100000"/>
+              </a:lnSpc>
+              <a:spcBef>
+                <a:spcPts val="0"/>
+              </a:spcBef>
+              <a:spcAft>
+                <a:spcPts val="0"/>
+              </a:spcAft>
+              <a:buClrTx/>
+              <a:buSzTx/>
+              <a:buFontTx/>
+              <a:buNone/>
+              <a:tabLst/>
+              <a:defRPr/>
+            </a:pPr>
+            <a:r>
+              <a:rPr lang="en-US" baseline="0" dirty="0" err="1" smtClean="0"/>
+              <a:t>Dataviz</a:t>
+            </a:r>
+            <a:r>
+              <a:rPr lang="en-US" baseline="0" dirty="0" smtClean="0"/>
+              <a:t> – an </a:t>
+            </a:r>
+            <a:r>
+              <a:rPr lang="en-US" baseline="0" dirty="0" err="1" smtClean="0"/>
+              <a:t>api</a:t>
+            </a:r>
+            <a:r>
+              <a:rPr lang="en-US" baseline="0" dirty="0" smtClean="0"/>
+              <a:t> that provides charts, graphs </a:t>
+            </a:r>
+            <a:r>
+              <a:rPr lang="en-US" baseline="0" dirty="0" err="1" smtClean="0"/>
+              <a:t>ertc</a:t>
+            </a:r>
+            <a:r>
+              <a:rPr lang="en-US" baseline="0" dirty="0" smtClean="0"/>
+              <a:t>, uses </a:t>
+            </a:r>
+            <a:r>
+              <a:rPr lang="en-US" baseline="0" dirty="0" err="1" smtClean="0"/>
+              <a:t>svg</a:t>
+            </a:r>
+            <a:r>
+              <a:rPr lang="en-US" baseline="0" dirty="0" smtClean="0"/>
+              <a:t> or </a:t>
+            </a:r>
+            <a:r>
+              <a:rPr lang="en-US" baseline="0" dirty="0" err="1" smtClean="0"/>
+              <a:t>vml</a:t>
+            </a:r>
+            <a:r>
+              <a:rPr lang="en-US" baseline="0" dirty="0" smtClean="0"/>
+              <a:t> to render data </a:t>
+            </a:r>
+            <a:r>
+              <a:rPr lang="en-US" baseline="0" dirty="0" err="1" smtClean="0"/>
+              <a:t>viz</a:t>
+            </a:r>
+            <a:r>
+              <a:rPr lang="en-US" baseline="0" dirty="0" smtClean="0"/>
+              <a:t> </a:t>
+            </a:r>
+          </a:p>
+          <a:p>
+            <a:pPr marL="0" marR="0" indent="0" algn="l" defTabSz="914400" rtl="0" eaLnBrk="1" fontAlgn="auto" latinLnBrk="0" hangingPunct="1">
+              <a:lnSpc>
+                <a:spcPct val="100000"/>
+              </a:lnSpc>
+              <a:spcBef>
+                <a:spcPts val="0"/>
+              </a:spcBef>
+              <a:spcAft>
+                <a:spcPts val="0"/>
+              </a:spcAft>
+              <a:buClrTx/>
+              <a:buSzTx/>
+              <a:buFontTx/>
+              <a:buNone/>
+              <a:tabLst/>
+              <a:defRPr/>
+            </a:pPr>
+            <a:endParaRPr lang="en-US" baseline="0" dirty="0" smtClean="0"/>
+          </a:p>
+          <a:p>
+            <a:pPr marL="0" marR="0" indent="0" algn="l" defTabSz="914400" rtl="0" eaLnBrk="1" fontAlgn="auto" latinLnBrk="0" hangingPunct="1">
+              <a:lnSpc>
+                <a:spcPct val="100000"/>
+              </a:lnSpc>
+              <a:spcBef>
+                <a:spcPts val="0"/>
+              </a:spcBef>
+              <a:spcAft>
+                <a:spcPts val="0"/>
+              </a:spcAft>
+              <a:buClrTx/>
+              <a:buSzTx/>
+              <a:buFontTx/>
+              <a:buNone/>
+              <a:tabLst/>
+              <a:defRPr/>
+            </a:pPr>
+            <a:endParaRPr lang="en-US" baseline="0" dirty="0" smtClean="0"/>
+          </a:p>
+          <a:p>
+            <a:pPr marL="0" marR="0" indent="0" algn="l" defTabSz="914400" rtl="0" eaLnBrk="1" fontAlgn="auto" latinLnBrk="0" hangingPunct="1">
+              <a:lnSpc>
+                <a:spcPct val="100000"/>
+              </a:lnSpc>
+              <a:spcBef>
+                <a:spcPts val="0"/>
+              </a:spcBef>
+              <a:spcAft>
+                <a:spcPts val="0"/>
+              </a:spcAft>
+              <a:buClrTx/>
+              <a:buSzTx/>
+              <a:buFontTx/>
+              <a:buNone/>
+              <a:tabLst/>
+              <a:defRPr/>
+            </a:pPr>
+            <a:endParaRPr lang="en-US" dirty="0" smtClean="0"/>
+          </a:p>
+          <a:p>
             <a:endParaRPr lang="en-US" dirty="0"/>
           </a:p>
         </p:txBody>
@@ -2842,6 +3655,34 @@
               <a:tabLst/>
               <a:defRPr/>
             </a:pPr>
+            <a:endParaRPr lang="en-US" sz="1200" b="0" i="0" kern="1200" dirty="0" smtClean="0">
+              <a:solidFill>
+                <a:schemeClr val="tx1"/>
+              </a:solidFill>
+              <a:effectLst/>
+              <a:latin typeface="+mn-lt"/>
+              <a:ea typeface="+mn-ea"/>
+              <a:cs typeface="+mn-cs"/>
+            </a:endParaRPr>
+          </a:p>
+          <a:p>
+            <a:pPr marL="0" marR="0" indent="0" algn="l" defTabSz="914400" rtl="0" eaLnBrk="1" fontAlgn="auto" latinLnBrk="0" hangingPunct="1">
+              <a:lnSpc>
+                <a:spcPct val="100000"/>
+              </a:lnSpc>
+              <a:spcBef>
+                <a:spcPts val="0"/>
+              </a:spcBef>
+              <a:spcAft>
+                <a:spcPts val="0"/>
+              </a:spcAft>
+              <a:buClrTx/>
+              <a:buSzTx/>
+              <a:buFontTx/>
+              <a:buNone/>
+              <a:tabLst/>
+              <a:defRPr/>
+            </a:pPr>
             <a:r>
               <a:rPr lang="en-US" sz="1200" b="0" i="0" kern="1200" dirty="0" smtClean="0">
                 <a:solidFill>
@@ -2852,9 +3693,32 @@
                 <a:ea typeface="+mn-ea"/>
                 <a:cs typeface="+mn-cs"/>
               </a:rPr>
-              <a:t>Kendo UI's widgets can be declaratively initialized using HTML5 data attributes.</a:t>
-            </a:r>
-            <a:endParaRPr lang="en-US" dirty="0"/>
+              <a:t>Kendo </a:t>
+            </a:r>
+            <a:r>
+              <a:rPr lang="en-US" sz="1200" b="0" i="0" kern="1200" dirty="0" smtClean="0">
+                <a:solidFill>
+                  <a:schemeClr val="tx1"/>
+                </a:solidFill>
+                <a:effectLst/>
+                <a:latin typeface="+mn-lt"/>
+                <a:ea typeface="+mn-ea"/>
+                <a:cs typeface="+mn-cs"/>
+              </a:rPr>
+              <a:t>UI's widgets can be declaratively initialized using HTML5 data attributes</a:t>
+            </a:r>
+            <a:r>
+              <a:rPr lang="en-US" sz="1200" b="0" i="0" kern="1200" dirty="0" smtClean="0">
+                <a:solidFill>
+                  <a:schemeClr val="tx1"/>
+                </a:solidFill>
+                <a:effectLst/>
+                <a:latin typeface="+mn-lt"/>
+                <a:ea typeface="+mn-ea"/>
+                <a:cs typeface="+mn-cs"/>
+              </a:rPr>
+              <a:t>.</a:t>
+            </a:r>
           </a:p>
         </p:txBody>
       </p:sp>
@@ -3234,7 +4098,7 @@
           <a:p>
             <a:fld id="{2BE96B4E-485B-4011-B172-D2B8261A77C4}" type="datetimeFigureOut">
               <a:rPr lang="en-GB" smtClean="0"/>
-              <a:t>16/03/2015</a:t>
+              <a:t>22/03/2015</a:t>
             </a:fld>
             <a:endParaRPr lang="en-GB"/>
           </a:p>
@@ -3399,7 +4263,7 @@
           <a:p>
             <a:fld id="{2BE96B4E-485B-4011-B172-D2B8261A77C4}" type="datetimeFigureOut">
               <a:rPr lang="en-GB" smtClean="0"/>
-              <a:t>16/03/2015</a:t>
+              <a:t>22/03/2015</a:t>
             </a:fld>
             <a:endParaRPr lang="en-GB"/>
           </a:p>
@@ -3574,7 +4438,7 @@
           <a:p>
             <a:fld id="{2BE96B4E-485B-4011-B172-D2B8261A77C4}" type="datetimeFigureOut">
               <a:rPr lang="en-GB" smtClean="0"/>
-              <a:t>16/03/2015</a:t>
+              <a:t>22/03/2015</a:t>
             </a:fld>
             <a:endParaRPr lang="en-GB"/>
           </a:p>
@@ -3739,7 +4603,7 @@
           <a:p>
             <a:fld id="{2BE96B4E-485B-4011-B172-D2B8261A77C4}" type="datetimeFigureOut">
               <a:rPr lang="en-GB" smtClean="0"/>
-              <a:t>16/03/2015</a:t>
+              <a:t>22/03/2015</a:t>
             </a:fld>
             <a:endParaRPr lang="en-GB"/>
           </a:p>
@@ -3987,7 +4851,7 @@
           <a:p>
             <a:fld id="{2BE96B4E-485B-4011-B172-D2B8261A77C4}" type="datetimeFigureOut">
               <a:rPr lang="en-GB" smtClean="0"/>
-              <a:t>16/03/2015</a:t>
+              <a:t>22/03/2015</a:t>
             </a:fld>
             <a:endParaRPr lang="en-GB"/>
           </a:p>
@@ -4270,7 +5134,7 @@
           <a:p>
             <a:fld id="{2BE96B4E-485B-4011-B172-D2B8261A77C4}" type="datetimeFigureOut">
               <a:rPr lang="en-GB" smtClean="0"/>
-              <a:t>16/03/2015</a:t>
+              <a:t>22/03/2015</a:t>
             </a:fld>
             <a:endParaRPr lang="en-GB"/>
           </a:p>
@@ -4699,7 +5563,7 @@
           <a:p>
             <a:fld id="{2BE96B4E-485B-4011-B172-D2B8261A77C4}" type="datetimeFigureOut">
               <a:rPr lang="en-GB" smtClean="0"/>
-              <a:t>16/03/2015</a:t>
+              <a:t>22/03/2015</a:t>
             </a:fld>
             <a:endParaRPr lang="en-GB"/>
           </a:p>
@@ -4812,7 +5676,7 @@
           <a:p>
             <a:fld id="{2BE96B4E-485B-4011-B172-D2B8261A77C4}" type="datetimeFigureOut">
               <a:rPr lang="en-GB" smtClean="0"/>
-              <a:t>16/03/2015</a:t>
+              <a:t>22/03/2015</a:t>
             </a:fld>
             <a:endParaRPr lang="en-GB"/>
           </a:p>
@@ -4902,7 +5766,7 @@
           <a:p>
             <a:fld id="{2BE96B4E-485B-4011-B172-D2B8261A77C4}" type="datetimeFigureOut">
               <a:rPr lang="en-GB" smtClean="0"/>
-              <a:t>16/03/2015</a:t>
+              <a:t>22/03/2015</a:t>
             </a:fld>
             <a:endParaRPr lang="en-GB"/>
           </a:p>
@@ -5091,7 +5955,7 @@
           <a:p>
             <a:fld id="{2BE96B4E-485B-4011-B172-D2B8261A77C4}" type="datetimeFigureOut">
               <a:rPr lang="en-GB" smtClean="0"/>
-              <a:t>16/03/2015</a:t>
+              <a:t>22/03/2015</a:t>
             </a:fld>
             <a:endParaRPr lang="en-GB"/>
           </a:p>
@@ -5409,7 +6273,7 @@
           <a:p>
             <a:fld id="{2BE96B4E-485B-4011-B172-D2B8261A77C4}" type="datetimeFigureOut">
               <a:rPr lang="en-GB" smtClean="0"/>
-              <a:t>16/03/2015</a:t>
+              <a:t>22/03/2015</a:t>
             </a:fld>
             <a:endParaRPr lang="en-GB"/>
           </a:p>
@@ -5788,7 +6652,7 @@
           <a:p>
             <a:fld id="{2BE96B4E-485B-4011-B172-D2B8261A77C4}" type="datetimeFigureOut">
               <a:rPr lang="en-GB" smtClean="0"/>
-              <a:t>16/03/2015</a:t>
+              <a:t>22/03/2015</a:t>
             </a:fld>
             <a:endParaRPr lang="en-GB"/>
           </a:p>
@@ -6151,15 +7015,13 @@
           <a:p>
             <a:r>
               <a:rPr lang="en-US" dirty="0" smtClean="0"/>
-              <a:t>AMAL DEV</a:t>
-            </a:r>
-          </a:p>
-          <a:p>
+              <a:t>AMAL </a:t>
+            </a:r>
             <a:r>
               <a:rPr lang="en-US" dirty="0" smtClean="0"/>
-              <a:t>UST GLOBAL</a:t>
-            </a:r>
-            <a:endParaRPr lang="en-GB" dirty="0"/>
+              <a:t>DEV</a:t>
+            </a:r>
+            <a:endParaRPr lang="en-US" dirty="0" smtClean="0"/>
           </a:p>
         </p:txBody>
       </p:sp>
@@ -6310,7 +7172,7 @@
 </file>
 
 <file path=ppt/slides/slide11.xml><?xml version="1.0" encoding="utf-8"?>
-<p:sld xmlns:a="http://schemas.openxmlformats.org/drawingml/2006/main" xmlns:r="http://schemas.openxmlformats.org/officeDocument/2006/relationships" xmlns:p="http://schemas.openxmlformats.org/presentationml/2006/main">
+<p:sld xmlns:a="http://schemas.openxmlformats.org/drawingml/2006/main" xmlns:r="http://schemas.openxmlformats.org/officeDocument/2006/relationships" xmlns:p="http://schemas.openxmlformats.org/presentationml/2006/main" show="0">
   <p:cSld>
     <p:spTree>
       <p:nvGrpSpPr>
@@ -6427,11 +7289,19 @@
   <p:clrMapOvr>
     <a:masterClrMapping/>
   </p:clrMapOvr>
+  <mc:AlternateContent xmlns:mc="http://schemas.openxmlformats.org/markup-compatibility/2006">
+    <mc:Choice xmlns:p14="http://schemas.microsoft.com/office/powerpoint/2010/main" Requires="p14">
+      <p:transition spd="slow" p14:dur="2000"/>
+    </mc:Choice>
+    <mc:Fallback>
+      <p:transition spd="slow"/>
+    </mc:Fallback>
+  </mc:AlternateContent>
 </p:sld>
 </file>
 
 <file path=ppt/slides/slide12.xml><?xml version="1.0" encoding="utf-8"?>
-<p:sld xmlns:a="http://schemas.openxmlformats.org/drawingml/2006/main" xmlns:r="http://schemas.openxmlformats.org/officeDocument/2006/relationships" xmlns:p="http://schemas.openxmlformats.org/presentationml/2006/main">
+<p:sld xmlns:a="http://schemas.openxmlformats.org/drawingml/2006/main" xmlns:r="http://schemas.openxmlformats.org/officeDocument/2006/relationships" xmlns:p="http://schemas.openxmlformats.org/presentationml/2006/main" show="0">
   <p:cSld>
     <p:spTree>
       <p:nvGrpSpPr>
@@ -6536,10 +7406,162 @@
   <p:clrMapOvr>
     <a:masterClrMapping/>
   </p:clrMapOvr>
+  <mc:AlternateContent xmlns:mc="http://schemas.openxmlformats.org/markup-compatibility/2006">
+    <mc:Choice xmlns:p14="http://schemas.microsoft.com/office/powerpoint/2010/main" Requires="p14">
+      <p:transition spd="slow" p14:dur="2000"/>
+    </mc:Choice>
+    <mc:Fallback>
+      <p:transition spd="slow"/>
+    </mc:Fallback>
+  </mc:AlternateContent>
 </p:sld>
 </file>
 
 <file path=ppt/slides/slide13.xml><?xml version="1.0" encoding="utf-8"?>
+<p:sld xmlns:a="http://schemas.openxmlformats.org/drawingml/2006/main" xmlns:r="http://schemas.openxmlformats.org/officeDocument/2006/relationships" xmlns:p="http://schemas.openxmlformats.org/presentationml/2006/main" show="0">
+  <p:cSld>
+    <p:spTree>
+      <p:nvGrpSpPr>
+        <p:cNvPr id="1" name=""/>
+        <p:cNvGrpSpPr/>
+        <p:nvPr/>
+      </p:nvGrpSpPr>
+      <p:grpSpPr>
+        <a:xfrm>
+          <a:off x="0" y="0"/>
+          <a:ext cx="0" cy="0"/>
+          <a:chOff x="0" y="0"/>
+          <a:chExt cx="0" cy="0"/>
+        </a:xfrm>
+      </p:grpSpPr>
+      <p:sp>
+        <p:nvSpPr>
+          <p:cNvPr id="2" name="Title 1"/>
+          <p:cNvSpPr>
+            <a:spLocks noGrp="1"/>
+          </p:cNvSpPr>
+          <p:nvPr>
+            <p:ph type="title"/>
+          </p:nvPr>
+        </p:nvSpPr>
+        <p:spPr/>
+        <p:txBody>
+          <a:bodyPr/>
+          <a:lstStyle/>
+          <a:p>
+            <a:r>
+              <a:rPr lang="en-US" dirty="0" smtClean="0"/>
+              <a:t>Validation</a:t>
+            </a:r>
+            <a:endParaRPr lang="en-US" dirty="0"/>
+          </a:p>
+        </p:txBody>
+      </p:sp>
+      <p:sp>
+        <p:nvSpPr>
+          <p:cNvPr id="4" name="Content Placeholder 3"/>
+          <p:cNvSpPr>
+            <a:spLocks noGrp="1"/>
+          </p:cNvSpPr>
+          <p:nvPr>
+            <p:ph idx="1"/>
+          </p:nvPr>
+        </p:nvSpPr>
+        <p:spPr/>
+        <p:txBody>
+          <a:bodyPr/>
+          <a:lstStyle/>
+          <a:p>
+            <a:r>
+              <a:rPr lang="en-US" dirty="0"/>
+              <a:t>Validator component</a:t>
+            </a:r>
+            <a:endParaRPr lang="en-US" dirty="0" smtClean="0"/>
+          </a:p>
+          <a:p>
+            <a:endParaRPr lang="en-US" dirty="0"/>
+          </a:p>
+          <a:p>
+            <a:endParaRPr lang="en-US" dirty="0"/>
+          </a:p>
+        </p:txBody>
+      </p:sp>
+      <p:pic>
+        <p:nvPicPr>
+          <p:cNvPr id="6" name="Picture 2"/>
+          <p:cNvPicPr>
+            <a:picLocks noChangeAspect="1" noChangeArrowheads="1"/>
+          </p:cNvPicPr>
+          <p:nvPr/>
+        </p:nvPicPr>
+        <p:blipFill>
+          <a:blip r:embed="rId3">
+            <a:extLst>
+              <a:ext uri="{28A0092B-C50C-407E-A947-70E740481C1C}">
+                <a14:useLocalDpi xmlns:a14="http://schemas.microsoft.com/office/drawing/2010/main" val="0"/>
+              </a:ext>
+            </a:extLst>
+          </a:blip>
+          <a:srcRect/>
+          <a:stretch>
+            <a:fillRect/>
+          </a:stretch>
+        </p:blipFill>
+        <p:spPr bwMode="auto">
+          <a:xfrm>
+            <a:off x="1671637" y="2590800"/>
+            <a:ext cx="5191125" cy="2819400"/>
+          </a:xfrm>
+          <a:prstGeom prst="rect">
+            <a:avLst/>
+          </a:prstGeom>
+          <a:noFill/>
+          <a:ln>
+            <a:noFill/>
+          </a:ln>
+          <a:extLst>
+            <a:ext uri="{909E8E84-426E-40DD-AFC4-6F175D3DCCD1}">
+              <a14:hiddenFill xmlns:a14="http://schemas.microsoft.com/office/drawing/2010/main">
+                <a:solidFill>
+                  <a:schemeClr val="accent1"/>
+                </a:solidFill>
+              </a14:hiddenFill>
+            </a:ext>
+            <a:ext uri="{91240B29-F687-4F45-9708-019B960494DF}">
+              <a14:hiddenLine xmlns:a14="http://schemas.microsoft.com/office/drawing/2010/main" w="9525">
+                <a:solidFill>
+                  <a:schemeClr val="tx1"/>
+                </a:solidFill>
+                <a:miter lim="800000"/>
+                <a:headEnd/>
+                <a:tailEnd/>
+              </a14:hiddenLine>
+            </a:ext>
+          </a:extLst>
+        </p:spPr>
+      </p:pic>
+    </p:spTree>
+    <p:extLst>
+      <p:ext uri="{BB962C8B-B14F-4D97-AF65-F5344CB8AC3E}">
+        <p14:creationId xmlns:p14="http://schemas.microsoft.com/office/powerpoint/2010/main" val="3604115851"/>
+      </p:ext>
+    </p:extLst>
+  </p:cSld>
+  <p:clrMapOvr>
+    <a:masterClrMapping/>
+  </p:clrMapOvr>
+  <mc:AlternateContent xmlns:mc="http://schemas.openxmlformats.org/markup-compatibility/2006">
+    <mc:Choice xmlns:p14="http://schemas.microsoft.com/office/powerpoint/2010/main" Requires="p14">
+      <p:transition spd="slow" p14:dur="2000"/>
+    </mc:Choice>
+    <mc:Fallback>
+      <p:transition spd="slow"/>
+    </mc:Fallback>
+  </mc:AlternateContent>
+</p:sld>
+</file>
+
+<file path=ppt/slides/slide14.xml><?xml version="1.0" encoding="utf-8"?>
 <p:sld xmlns:a="http://schemas.openxmlformats.org/drawingml/2006/main" xmlns:r="http://schemas.openxmlformats.org/officeDocument/2006/relationships" xmlns:p="http://schemas.openxmlformats.org/presentationml/2006/main">
   <p:cSld>
     <p:spTree>
@@ -6754,142 +7776,6 @@
       </p:par>
     </p:tnLst>
   </p:timing>
-</p:sld>
-</file>
-
-<file path=ppt/slides/slide14.xml><?xml version="1.0" encoding="utf-8"?>
-<p:sld xmlns:a="http://schemas.openxmlformats.org/drawingml/2006/main" xmlns:r="http://schemas.openxmlformats.org/officeDocument/2006/relationships" xmlns:p="http://schemas.openxmlformats.org/presentationml/2006/main">
-  <p:cSld>
-    <p:spTree>
-      <p:nvGrpSpPr>
-        <p:cNvPr id="1" name=""/>
-        <p:cNvGrpSpPr/>
-        <p:nvPr/>
-      </p:nvGrpSpPr>
-      <p:grpSpPr>
-        <a:xfrm>
-          <a:off x="0" y="0"/>
-          <a:ext cx="0" cy="0"/>
-          <a:chOff x="0" y="0"/>
-          <a:chExt cx="0" cy="0"/>
-        </a:xfrm>
-      </p:grpSpPr>
-      <p:sp>
-        <p:nvSpPr>
-          <p:cNvPr id="2" name="Title 1"/>
-          <p:cNvSpPr>
-            <a:spLocks noGrp="1"/>
-          </p:cNvSpPr>
-          <p:nvPr>
-            <p:ph type="title"/>
-          </p:nvPr>
-        </p:nvSpPr>
-        <p:spPr/>
-        <p:txBody>
-          <a:bodyPr/>
-          <a:lstStyle/>
-          <a:p>
-            <a:r>
-              <a:rPr lang="en-US" dirty="0" smtClean="0"/>
-              <a:t>Validation</a:t>
-            </a:r>
-            <a:endParaRPr lang="en-US" dirty="0"/>
-          </a:p>
-        </p:txBody>
-      </p:sp>
-      <p:sp>
-        <p:nvSpPr>
-          <p:cNvPr id="4" name="Content Placeholder 3"/>
-          <p:cNvSpPr>
-            <a:spLocks noGrp="1"/>
-          </p:cNvSpPr>
-          <p:nvPr>
-            <p:ph idx="1"/>
-          </p:nvPr>
-        </p:nvSpPr>
-        <p:spPr/>
-        <p:txBody>
-          <a:bodyPr/>
-          <a:lstStyle/>
-          <a:p>
-            <a:r>
-              <a:rPr lang="en-US" dirty="0"/>
-              <a:t>Validator component</a:t>
-            </a:r>
-            <a:endParaRPr lang="en-US" dirty="0" smtClean="0"/>
-          </a:p>
-          <a:p>
-            <a:endParaRPr lang="en-US" dirty="0"/>
-          </a:p>
-          <a:p>
-            <a:endParaRPr lang="en-US" dirty="0"/>
-          </a:p>
-        </p:txBody>
-      </p:sp>
-      <p:pic>
-        <p:nvPicPr>
-          <p:cNvPr id="6" name="Picture 2"/>
-          <p:cNvPicPr>
-            <a:picLocks noChangeAspect="1" noChangeArrowheads="1"/>
-          </p:cNvPicPr>
-          <p:nvPr/>
-        </p:nvPicPr>
-        <p:blipFill>
-          <a:blip r:embed="rId3">
-            <a:extLst>
-              <a:ext uri="{28A0092B-C50C-407E-A947-70E740481C1C}">
-                <a14:useLocalDpi xmlns:a14="http://schemas.microsoft.com/office/drawing/2010/main" val="0"/>
-              </a:ext>
-            </a:extLst>
-          </a:blip>
-          <a:srcRect/>
-          <a:stretch>
-            <a:fillRect/>
-          </a:stretch>
-        </p:blipFill>
-        <p:spPr bwMode="auto">
-          <a:xfrm>
-            <a:off x="1671637" y="2590800"/>
-            <a:ext cx="5191125" cy="2819400"/>
-          </a:xfrm>
-          <a:prstGeom prst="rect">
-            <a:avLst/>
-          </a:prstGeom>
-          <a:noFill/>
-          <a:ln>
-            <a:noFill/>
-          </a:ln>
-          <a:extLst>
-            <a:ext uri="{909E8E84-426E-40DD-AFC4-6F175D3DCCD1}">
-              <a14:hiddenFill xmlns:a14="http://schemas.microsoft.com/office/drawing/2010/main">
-                <a:solidFill>
-                  <a:schemeClr val="accent1"/>
-                </a:solidFill>
-              </a14:hiddenFill>
-            </a:ext>
-            <a:ext uri="{91240B29-F687-4F45-9708-019B960494DF}">
-              <a14:hiddenLine xmlns:a14="http://schemas.microsoft.com/office/drawing/2010/main" w="9525">
-                <a:solidFill>
-                  <a:schemeClr val="tx1"/>
-                </a:solidFill>
-                <a:miter lim="800000"/>
-                <a:headEnd/>
-                <a:tailEnd/>
-              </a14:hiddenLine>
-            </a:ext>
-          </a:extLst>
-        </p:spPr>
-      </p:pic>
-    </p:spTree>
-    <p:extLst>
-      <p:ext uri="{BB962C8B-B14F-4D97-AF65-F5344CB8AC3E}">
-        <p14:creationId xmlns:p14="http://schemas.microsoft.com/office/powerpoint/2010/main" val="3604115851"/>
-      </p:ext>
-    </p:extLst>
-  </p:cSld>
-  <p:clrMapOvr>
-    <a:masterClrMapping/>
-  </p:clrMapOvr>
 </p:sld>
 </file>
 
@@ -7832,7 +8718,22 @@
             </a:pPr>
             <a:r>
               <a:rPr lang="en-US" dirty="0" smtClean="0"/>
-              <a:t>Web Widgets</a:t>
+              <a:t>Web </a:t>
+            </a:r>
+            <a:r>
+              <a:rPr lang="en-US" dirty="0" smtClean="0"/>
+              <a:t>Widgets</a:t>
+            </a:r>
+          </a:p>
+          <a:p>
+            <a:pPr>
+              <a:lnSpc>
+                <a:spcPct val="150000"/>
+              </a:lnSpc>
+            </a:pPr>
+            <a:r>
+              <a:rPr lang="en-US" dirty="0" smtClean="0"/>
+              <a:t>Theming and Styling</a:t>
             </a:r>
             <a:endParaRPr lang="en-GB" dirty="0"/>
           </a:p>
@@ -7927,11 +8828,7 @@
           <a:p>
             <a:r>
               <a:rPr lang="en-US" dirty="0" smtClean="0"/>
-              <a:t>Obtaining </a:t>
-            </a:r>
-            <a:r>
-              <a:rPr lang="en-US" dirty="0" smtClean="0"/>
-              <a:t>Reference</a:t>
+              <a:t>Obtaining Reference</a:t>
             </a:r>
           </a:p>
           <a:p>
@@ -7939,7 +8836,6 @@
               <a:rPr lang="en-US" dirty="0" smtClean="0"/>
               <a:t>Widget Configuration</a:t>
             </a:r>
-            <a:endParaRPr lang="en-US" dirty="0" smtClean="0"/>
           </a:p>
           <a:p>
             <a:r>
@@ -8038,7 +8934,6 @@
               <a:rPr lang="en-US" dirty="0" smtClean="0"/>
               <a:t>Predefined Themes Included out of the box</a:t>
             </a:r>
-            <a:endParaRPr lang="en-US" dirty="0" smtClean="0"/>
           </a:p>
           <a:p>
             <a:pPr>
@@ -8054,7 +8949,6 @@
               <a:rPr lang="en-US" dirty="0" smtClean="0"/>
               <a:t> Support</a:t>
             </a:r>
-            <a:endParaRPr lang="en-US" dirty="0" smtClean="0"/>
           </a:p>
           <a:p>
             <a:endParaRPr lang="en-GB" dirty="0"/>
@@ -8133,21 +9027,18 @@
               <a:rPr lang="en-US" dirty="0" smtClean="0"/>
               <a:t>Applying Styles</a:t>
             </a:r>
-            <a:endParaRPr lang="en-US" dirty="0" smtClean="0"/>
           </a:p>
           <a:p>
             <a:r>
               <a:rPr lang="en-US" dirty="0" smtClean="0"/>
               <a:t>Adding Default Theme</a:t>
             </a:r>
-            <a:endParaRPr lang="en-US" dirty="0" smtClean="0"/>
           </a:p>
           <a:p>
             <a:r>
               <a:rPr lang="en-US" dirty="0" smtClean="0"/>
               <a:t>Changing Themes</a:t>
             </a:r>
-            <a:endParaRPr lang="en-US" dirty="0" smtClean="0"/>
           </a:p>
           <a:p>
             <a:r>
@@ -8162,6 +9053,410 @@
     <p:extLst>
       <p:ext uri="{BB962C8B-B14F-4D97-AF65-F5344CB8AC3E}">
         <p14:creationId xmlns:p14="http://schemas.microsoft.com/office/powerpoint/2010/main" val="1692043711"/>
+      </p:ext>
+    </p:extLst>
+  </p:cSld>
+  <p:clrMapOvr>
+    <a:masterClrMapping/>
+  </p:clrMapOvr>
+</p:sld>
+</file>
+
+<file path=ppt/slides/slide23.xml><?xml version="1.0" encoding="utf-8"?>
+<p:sld xmlns:a="http://schemas.openxmlformats.org/drawingml/2006/main" xmlns:r="http://schemas.openxmlformats.org/officeDocument/2006/relationships" xmlns:p="http://schemas.openxmlformats.org/presentationml/2006/main">
+  <p:cSld>
+    <p:spTree>
+      <p:nvGrpSpPr>
+        <p:cNvPr id="1" name=""/>
+        <p:cNvGrpSpPr/>
+        <p:nvPr/>
+      </p:nvGrpSpPr>
+      <p:grpSpPr>
+        <a:xfrm>
+          <a:off x="0" y="0"/>
+          <a:ext cx="0" cy="0"/>
+          <a:chOff x="0" y="0"/>
+          <a:chExt cx="0" cy="0"/>
+        </a:xfrm>
+      </p:grpSpPr>
+      <p:sp>
+        <p:nvSpPr>
+          <p:cNvPr id="2" name="Title 1"/>
+          <p:cNvSpPr>
+            <a:spLocks noGrp="1"/>
+          </p:cNvSpPr>
+          <p:nvPr>
+            <p:ph type="title"/>
+          </p:nvPr>
+        </p:nvSpPr>
+        <p:spPr/>
+        <p:txBody>
+          <a:bodyPr/>
+          <a:lstStyle/>
+          <a:p>
+            <a:r>
+              <a:rPr lang="en-US" dirty="0" smtClean="0"/>
+              <a:t>Globalization</a:t>
+            </a:r>
+            <a:endParaRPr lang="en-GB" dirty="0"/>
+          </a:p>
+        </p:txBody>
+      </p:sp>
+      <p:sp>
+        <p:nvSpPr>
+          <p:cNvPr id="3" name="Content Placeholder 2"/>
+          <p:cNvSpPr>
+            <a:spLocks noGrp="1"/>
+          </p:cNvSpPr>
+          <p:nvPr>
+            <p:ph idx="1"/>
+          </p:nvPr>
+        </p:nvSpPr>
+        <p:spPr/>
+        <p:txBody>
+          <a:bodyPr/>
+          <a:lstStyle/>
+          <a:p>
+            <a:r>
+              <a:rPr lang="en-US" dirty="0" smtClean="0"/>
+              <a:t>Supported Widgets</a:t>
+            </a:r>
+          </a:p>
+          <a:p>
+            <a:pPr lvl="1">
+              <a:lnSpc>
+                <a:spcPct val="150000"/>
+              </a:lnSpc>
+            </a:pPr>
+            <a:r>
+              <a:rPr lang="en-GB" dirty="0"/>
+              <a:t>Calendar</a:t>
+            </a:r>
+          </a:p>
+          <a:p>
+            <a:pPr lvl="1">
+              <a:lnSpc>
+                <a:spcPct val="150000"/>
+              </a:lnSpc>
+            </a:pPr>
+            <a:r>
+              <a:rPr lang="en-GB" dirty="0" err="1"/>
+              <a:t>DatePicker</a:t>
+            </a:r>
+            <a:endParaRPr lang="en-GB" dirty="0"/>
+          </a:p>
+          <a:p>
+            <a:pPr lvl="1">
+              <a:lnSpc>
+                <a:spcPct val="150000"/>
+              </a:lnSpc>
+            </a:pPr>
+            <a:r>
+              <a:rPr lang="en-GB" dirty="0" err="1"/>
+              <a:t>TimePicker</a:t>
+            </a:r>
+            <a:endParaRPr lang="en-GB" dirty="0"/>
+          </a:p>
+          <a:p>
+            <a:pPr lvl="1">
+              <a:lnSpc>
+                <a:spcPct val="150000"/>
+              </a:lnSpc>
+            </a:pPr>
+            <a:r>
+              <a:rPr lang="en-GB" dirty="0" err="1"/>
+              <a:t>DateTimePicker</a:t>
+            </a:r>
+            <a:endParaRPr lang="en-GB" dirty="0"/>
+          </a:p>
+          <a:p>
+            <a:pPr lvl="1">
+              <a:lnSpc>
+                <a:spcPct val="150000"/>
+              </a:lnSpc>
+            </a:pPr>
+            <a:r>
+              <a:rPr lang="en-GB" dirty="0" err="1"/>
+              <a:t>NumericTextBox</a:t>
+            </a:r>
+            <a:endParaRPr lang="en-GB" dirty="0"/>
+          </a:p>
+          <a:p>
+            <a:pPr lvl="1">
+              <a:lnSpc>
+                <a:spcPct val="150000"/>
+              </a:lnSpc>
+            </a:pPr>
+            <a:r>
+              <a:rPr lang="en-GB" dirty="0" err="1"/>
+              <a:t>MaskedTextBox</a:t>
+            </a:r>
+            <a:r>
+              <a:rPr lang="en-GB" dirty="0"/>
+              <a:t> (globalized mask literals)</a:t>
+            </a:r>
+          </a:p>
+          <a:p>
+            <a:pPr lvl="1">
+              <a:lnSpc>
+                <a:spcPct val="150000"/>
+              </a:lnSpc>
+            </a:pPr>
+            <a:r>
+              <a:rPr lang="en-GB" dirty="0"/>
+              <a:t>Scheduler</a:t>
+            </a:r>
+          </a:p>
+          <a:p>
+            <a:pPr lvl="1">
+              <a:lnSpc>
+                <a:spcPct val="150000"/>
+              </a:lnSpc>
+            </a:pPr>
+            <a:r>
+              <a:rPr lang="en-GB" dirty="0"/>
+              <a:t>Gantt</a:t>
+            </a:r>
+          </a:p>
+          <a:p>
+            <a:endParaRPr lang="en-US" dirty="0" smtClean="0"/>
+          </a:p>
+        </p:txBody>
+      </p:sp>
+    </p:spTree>
+    <p:extLst>
+      <p:ext uri="{BB962C8B-B14F-4D97-AF65-F5344CB8AC3E}">
+        <p14:creationId xmlns:p14="http://schemas.microsoft.com/office/powerpoint/2010/main" val="1854218391"/>
+      </p:ext>
+    </p:extLst>
+  </p:cSld>
+  <p:clrMapOvr>
+    <a:masterClrMapping/>
+  </p:clrMapOvr>
+</p:sld>
+</file>
+
+<file path=ppt/slides/slide24.xml><?xml version="1.0" encoding="utf-8"?>
+<p:sld xmlns:a="http://schemas.openxmlformats.org/drawingml/2006/main" xmlns:r="http://schemas.openxmlformats.org/officeDocument/2006/relationships" xmlns:p="http://schemas.openxmlformats.org/presentationml/2006/main">
+  <p:cSld>
+    <p:spTree>
+      <p:nvGrpSpPr>
+        <p:cNvPr id="1" name=""/>
+        <p:cNvGrpSpPr/>
+        <p:nvPr/>
+      </p:nvGrpSpPr>
+      <p:grpSpPr>
+        <a:xfrm>
+          <a:off x="0" y="0"/>
+          <a:ext cx="0" cy="0"/>
+          <a:chOff x="0" y="0"/>
+          <a:chExt cx="0" cy="0"/>
+        </a:xfrm>
+      </p:grpSpPr>
+      <p:sp>
+        <p:nvSpPr>
+          <p:cNvPr id="2" name="Title 1"/>
+          <p:cNvSpPr>
+            <a:spLocks noGrp="1"/>
+          </p:cNvSpPr>
+          <p:nvPr>
+            <p:ph type="title"/>
+          </p:nvPr>
+        </p:nvSpPr>
+        <p:spPr/>
+        <p:txBody>
+          <a:bodyPr/>
+          <a:lstStyle/>
+          <a:p>
+            <a:r>
+              <a:rPr lang="en-US" dirty="0" smtClean="0"/>
+              <a:t>Globalization - Demo</a:t>
+            </a:r>
+            <a:endParaRPr lang="en-GB" dirty="0"/>
+          </a:p>
+        </p:txBody>
+      </p:sp>
+      <p:sp>
+        <p:nvSpPr>
+          <p:cNvPr id="3" name="Content Placeholder 2"/>
+          <p:cNvSpPr>
+            <a:spLocks noGrp="1"/>
+          </p:cNvSpPr>
+          <p:nvPr>
+            <p:ph idx="1"/>
+          </p:nvPr>
+        </p:nvSpPr>
+        <p:spPr/>
+        <p:txBody>
+          <a:bodyPr/>
+          <a:lstStyle/>
+          <a:p>
+            <a:endParaRPr lang="en-GB" dirty="0"/>
+          </a:p>
+        </p:txBody>
+      </p:sp>
+    </p:spTree>
+    <p:extLst>
+      <p:ext uri="{BB962C8B-B14F-4D97-AF65-F5344CB8AC3E}">
+        <p14:creationId xmlns:p14="http://schemas.microsoft.com/office/powerpoint/2010/main" val="1905092511"/>
+      </p:ext>
+    </p:extLst>
+  </p:cSld>
+  <p:clrMapOvr>
+    <a:masterClrMapping/>
+  </p:clrMapOvr>
+</p:sld>
+</file>
+
+<file path=ppt/slides/slide25.xml><?xml version="1.0" encoding="utf-8"?>
+<p:sld xmlns:a="http://schemas.openxmlformats.org/drawingml/2006/main" xmlns:r="http://schemas.openxmlformats.org/officeDocument/2006/relationships" xmlns:p="http://schemas.openxmlformats.org/presentationml/2006/main">
+  <p:cSld>
+    <p:spTree>
+      <p:nvGrpSpPr>
+        <p:cNvPr id="1" name=""/>
+        <p:cNvGrpSpPr/>
+        <p:nvPr/>
+      </p:nvGrpSpPr>
+      <p:grpSpPr>
+        <a:xfrm>
+          <a:off x="0" y="0"/>
+          <a:ext cx="0" cy="0"/>
+          <a:chOff x="0" y="0"/>
+          <a:chExt cx="0" cy="0"/>
+        </a:xfrm>
+      </p:grpSpPr>
+      <p:sp>
+        <p:nvSpPr>
+          <p:cNvPr id="4" name="Title 3"/>
+          <p:cNvSpPr>
+            <a:spLocks noGrp="1"/>
+          </p:cNvSpPr>
+          <p:nvPr>
+            <p:ph type="ctrTitle"/>
+          </p:nvPr>
+        </p:nvSpPr>
+        <p:spPr/>
+        <p:txBody>
+          <a:bodyPr/>
+          <a:lstStyle/>
+          <a:p>
+            <a:r>
+              <a:rPr lang="en-US" dirty="0" smtClean="0"/>
+              <a:t>Questions </a:t>
+            </a:r>
+            <a:endParaRPr lang="en-GB" dirty="0"/>
+          </a:p>
+        </p:txBody>
+      </p:sp>
+      <p:sp>
+        <p:nvSpPr>
+          <p:cNvPr id="5" name="Subtitle 4"/>
+          <p:cNvSpPr>
+            <a:spLocks noGrp="1"/>
+          </p:cNvSpPr>
+          <p:nvPr>
+            <p:ph type="subTitle" idx="1"/>
+          </p:nvPr>
+        </p:nvSpPr>
+        <p:spPr/>
+        <p:txBody>
+          <a:bodyPr/>
+          <a:lstStyle/>
+          <a:p>
+            <a:endParaRPr lang="en-GB"/>
+          </a:p>
+        </p:txBody>
+      </p:sp>
+    </p:spTree>
+    <p:extLst>
+      <p:ext uri="{BB962C8B-B14F-4D97-AF65-F5344CB8AC3E}">
+        <p14:creationId xmlns:p14="http://schemas.microsoft.com/office/powerpoint/2010/main" val="987806039"/>
+      </p:ext>
+    </p:extLst>
+  </p:cSld>
+  <p:clrMapOvr>
+    <a:masterClrMapping/>
+  </p:clrMapOvr>
+</p:sld>
+</file>
+
+<file path=ppt/slides/slide26.xml><?xml version="1.0" encoding="utf-8"?>
+<p:sld xmlns:a="http://schemas.openxmlformats.org/drawingml/2006/main" xmlns:r="http://schemas.openxmlformats.org/officeDocument/2006/relationships" xmlns:p="http://schemas.openxmlformats.org/presentationml/2006/main">
+  <p:cSld>
+    <p:spTree>
+      <p:nvGrpSpPr>
+        <p:cNvPr id="1" name=""/>
+        <p:cNvGrpSpPr/>
+        <p:nvPr/>
+      </p:nvGrpSpPr>
+      <p:grpSpPr>
+        <a:xfrm>
+          <a:off x="0" y="0"/>
+          <a:ext cx="0" cy="0"/>
+          <a:chOff x="0" y="0"/>
+          <a:chExt cx="0" cy="0"/>
+        </a:xfrm>
+      </p:grpSpPr>
+      <p:sp>
+        <p:nvSpPr>
+          <p:cNvPr id="4" name="Title 3"/>
+          <p:cNvSpPr>
+            <a:spLocks noGrp="1"/>
+          </p:cNvSpPr>
+          <p:nvPr>
+            <p:ph type="ctrTitle"/>
+          </p:nvPr>
+        </p:nvSpPr>
+        <p:spPr/>
+        <p:txBody>
+          <a:bodyPr/>
+          <a:lstStyle/>
+          <a:p>
+            <a:r>
+              <a:rPr lang="en-US" dirty="0" smtClean="0"/>
+              <a:t>Thank You</a:t>
+            </a:r>
+            <a:endParaRPr lang="en-GB" dirty="0"/>
+          </a:p>
+        </p:txBody>
+      </p:sp>
+      <p:sp>
+        <p:nvSpPr>
+          <p:cNvPr id="5" name="Subtitle 4"/>
+          <p:cNvSpPr>
+            <a:spLocks noGrp="1"/>
+          </p:cNvSpPr>
+          <p:nvPr>
+            <p:ph type="subTitle" idx="1"/>
+          </p:nvPr>
+        </p:nvSpPr>
+        <p:spPr/>
+        <p:txBody>
+          <a:bodyPr/>
+          <a:lstStyle/>
+          <a:p>
+            <a:r>
+              <a:rPr lang="en-US" dirty="0" err="1" smtClean="0"/>
+              <a:t>Amal</a:t>
+            </a:r>
+            <a:r>
+              <a:rPr lang="en-US" dirty="0" smtClean="0"/>
+              <a:t> Dev</a:t>
+            </a:r>
+          </a:p>
+          <a:p>
+            <a:r>
+              <a:rPr lang="en-US" sz="1600" dirty="0" smtClean="0"/>
+              <a:t>www.techrepository.in</a:t>
+            </a:r>
+            <a:endParaRPr lang="en-GB" sz="1600" dirty="0"/>
+          </a:p>
+        </p:txBody>
+      </p:sp>
+    </p:spTree>
+    <p:extLst>
+      <p:ext uri="{BB962C8B-B14F-4D97-AF65-F5344CB8AC3E}">
+        <p14:creationId xmlns:p14="http://schemas.microsoft.com/office/powerpoint/2010/main" val="2775814235"/>
       </p:ext>
     </p:extLst>
   </p:cSld>
@@ -8335,7 +9630,7 @@
           <a:p>
             <a:r>
               <a:rPr lang="en-US" dirty="0" smtClean="0"/>
-              <a:t>Overview</a:t>
+              <a:t>What is Kendo UI</a:t>
             </a:r>
             <a:endParaRPr lang="en-GB" dirty="0"/>
           </a:p>

</xml_diff>